<commit_message>
Added last lab report
Добавлен отчет по лабораторной работе (обновленный вариант)
</commit_message>
<xml_diff>
--- a/Отчет по лабораторной работе №1.pptx
+++ b/Отчет по лабораторной работе №1.pptx
@@ -18,8 +18,11 @@
     <p:sldId id="266" r:id="rId12"/>
     <p:sldId id="269" r:id="rId13"/>
     <p:sldId id="270" r:id="rId14"/>
-    <p:sldId id="271" r:id="rId15"/>
-    <p:sldId id="272" r:id="rId16"/>
+    <p:sldId id="273" r:id="rId15"/>
+    <p:sldId id="271" r:id="rId16"/>
+    <p:sldId id="272" r:id="rId17"/>
+    <p:sldId id="274" r:id="rId18"/>
+    <p:sldId id="275" r:id="rId19"/>
   </p:sldIdLst>
   <p:sldSz cx="12192000" cy="6858000"/>
   <p:notesSz cx="6858000" cy="9144000"/>
@@ -257,7 +260,7 @@
           <a:p>
             <a:fld id="{A69EF7A9-D68F-4A56-97A8-D340A37840EB}" type="datetimeFigureOut">
               <a:rPr lang="ru-RU" smtClean="0"/>
-              <a:t>19.09.2022</a:t>
+              <a:t>20.09.2022</a:t>
             </a:fld>
             <a:endParaRPr lang="ru-RU"/>
           </a:p>
@@ -427,7 +430,7 @@
           <a:p>
             <a:fld id="{A69EF7A9-D68F-4A56-97A8-D340A37840EB}" type="datetimeFigureOut">
               <a:rPr lang="ru-RU" smtClean="0"/>
-              <a:t>19.09.2022</a:t>
+              <a:t>20.09.2022</a:t>
             </a:fld>
             <a:endParaRPr lang="ru-RU"/>
           </a:p>
@@ -607,7 +610,7 @@
           <a:p>
             <a:fld id="{A69EF7A9-D68F-4A56-97A8-D340A37840EB}" type="datetimeFigureOut">
               <a:rPr lang="ru-RU" smtClean="0"/>
-              <a:t>19.09.2022</a:t>
+              <a:t>20.09.2022</a:t>
             </a:fld>
             <a:endParaRPr lang="ru-RU"/>
           </a:p>
@@ -777,7 +780,7 @@
           <a:p>
             <a:fld id="{A69EF7A9-D68F-4A56-97A8-D340A37840EB}" type="datetimeFigureOut">
               <a:rPr lang="ru-RU" smtClean="0"/>
-              <a:t>19.09.2022</a:t>
+              <a:t>20.09.2022</a:t>
             </a:fld>
             <a:endParaRPr lang="ru-RU"/>
           </a:p>
@@ -1023,7 +1026,7 @@
           <a:p>
             <a:fld id="{A69EF7A9-D68F-4A56-97A8-D340A37840EB}" type="datetimeFigureOut">
               <a:rPr lang="ru-RU" smtClean="0"/>
-              <a:t>19.09.2022</a:t>
+              <a:t>20.09.2022</a:t>
             </a:fld>
             <a:endParaRPr lang="ru-RU"/>
           </a:p>
@@ -1255,7 +1258,7 @@
           <a:p>
             <a:fld id="{A69EF7A9-D68F-4A56-97A8-D340A37840EB}" type="datetimeFigureOut">
               <a:rPr lang="ru-RU" smtClean="0"/>
-              <a:t>19.09.2022</a:t>
+              <a:t>20.09.2022</a:t>
             </a:fld>
             <a:endParaRPr lang="ru-RU"/>
           </a:p>
@@ -1622,7 +1625,7 @@
           <a:p>
             <a:fld id="{A69EF7A9-D68F-4A56-97A8-D340A37840EB}" type="datetimeFigureOut">
               <a:rPr lang="ru-RU" smtClean="0"/>
-              <a:t>19.09.2022</a:t>
+              <a:t>20.09.2022</a:t>
             </a:fld>
             <a:endParaRPr lang="ru-RU"/>
           </a:p>
@@ -1740,7 +1743,7 @@
           <a:p>
             <a:fld id="{A69EF7A9-D68F-4A56-97A8-D340A37840EB}" type="datetimeFigureOut">
               <a:rPr lang="ru-RU" smtClean="0"/>
-              <a:t>19.09.2022</a:t>
+              <a:t>20.09.2022</a:t>
             </a:fld>
             <a:endParaRPr lang="ru-RU"/>
           </a:p>
@@ -1835,7 +1838,7 @@
           <a:p>
             <a:fld id="{A69EF7A9-D68F-4A56-97A8-D340A37840EB}" type="datetimeFigureOut">
               <a:rPr lang="ru-RU" smtClean="0"/>
-              <a:t>19.09.2022</a:t>
+              <a:t>20.09.2022</a:t>
             </a:fld>
             <a:endParaRPr lang="ru-RU"/>
           </a:p>
@@ -2112,7 +2115,7 @@
           <a:p>
             <a:fld id="{A69EF7A9-D68F-4A56-97A8-D340A37840EB}" type="datetimeFigureOut">
               <a:rPr lang="ru-RU" smtClean="0"/>
-              <a:t>19.09.2022</a:t>
+              <a:t>20.09.2022</a:t>
             </a:fld>
             <a:endParaRPr lang="ru-RU"/>
           </a:p>
@@ -2365,7 +2368,7 @@
           <a:p>
             <a:fld id="{A69EF7A9-D68F-4A56-97A8-D340A37840EB}" type="datetimeFigureOut">
               <a:rPr lang="ru-RU" smtClean="0"/>
-              <a:t>19.09.2022</a:t>
+              <a:t>20.09.2022</a:t>
             </a:fld>
             <a:endParaRPr lang="ru-RU"/>
           </a:p>
@@ -2578,7 +2581,7 @@
           <a:p>
             <a:fld id="{A69EF7A9-D68F-4A56-97A8-D340A37840EB}" type="datetimeFigureOut">
               <a:rPr lang="ru-RU" smtClean="0"/>
-              <a:t>19.09.2022</a:t>
+              <a:t>20.09.2022</a:t>
             </a:fld>
             <a:endParaRPr lang="ru-RU"/>
           </a:p>
@@ -3122,23 +3125,7 @@
             </a:pPr>
             <a:r>
               <a:rPr lang="ru-RU" dirty="0" smtClean="0"/>
-              <a:t>	Не </a:t>
-            </a:r>
-            <a:r>
-              <a:rPr lang="ru-RU" dirty="0" smtClean="0"/>
-              <a:t>забываю </a:t>
-            </a:r>
-            <a:r>
-              <a:rPr lang="ru-RU" dirty="0" smtClean="0"/>
-              <a:t>добавить </a:t>
-            </a:r>
-            <a:r>
-              <a:rPr lang="ru-RU" dirty="0" smtClean="0"/>
-              <a:t>файл, в который записывается результат, в </a:t>
-            </a:r>
-            <a:r>
-              <a:rPr lang="ru-RU" dirty="0" smtClean="0"/>
-              <a:t>.</a:t>
+              <a:t>	Не забываю добавить файл, в который записывается результат, в .</a:t>
             </a:r>
             <a:r>
               <a:rPr lang="en-US" dirty="0" err="1" smtClean="0"/>
@@ -3150,11 +3137,7 @@
             </a:r>
             <a:r>
               <a:rPr lang="ru-RU" dirty="0" smtClean="0"/>
-              <a:t>и </a:t>
-            </a:r>
-            <a:r>
-              <a:rPr lang="ru-RU" dirty="0" smtClean="0"/>
-              <a:t>делаю </a:t>
+              <a:t>и делаю </a:t>
             </a:r>
             <a:r>
               <a:rPr lang="ru-RU" dirty="0" err="1" smtClean="0"/>
@@ -3291,15 +3274,7 @@
             </a:r>
             <a:r>
               <a:rPr lang="ru-RU" dirty="0" smtClean="0"/>
-              <a:t> </a:t>
-            </a:r>
-            <a:r>
-              <a:rPr lang="ru-RU" dirty="0" smtClean="0"/>
-              <a:t>списки </a:t>
-            </a:r>
-            <a:r>
-              <a:rPr lang="ru-RU" dirty="0" smtClean="0"/>
-              <a:t>придется постоянно перепроверять на </a:t>
+              <a:t> списки придется постоянно перепроверять на </a:t>
             </a:r>
             <a:r>
               <a:rPr lang="ru-RU" dirty="0" err="1" smtClean="0"/>
@@ -3430,11 +3405,7 @@
             </a:r>
             <a:r>
               <a:rPr lang="ru-RU" dirty="0" smtClean="0"/>
-              <a:t>адание </a:t>
-            </a:r>
-            <a:r>
-              <a:rPr lang="ru-RU" dirty="0" smtClean="0"/>
-              <a:t>1</a:t>
+              <a:t>адание 1</a:t>
             </a:r>
             <a:endParaRPr lang="ru-RU" dirty="0"/>
           </a:p>
@@ -3465,15 +3436,7 @@
             </a:pPr>
             <a:r>
               <a:rPr lang="ru-RU" dirty="0" smtClean="0"/>
-              <a:t>	Для </a:t>
-            </a:r>
-            <a:r>
-              <a:rPr lang="ru-RU" dirty="0" smtClean="0"/>
-              <a:t>этой цели идеально </a:t>
-            </a:r>
-            <a:r>
-              <a:rPr lang="ru-RU" dirty="0" smtClean="0"/>
-              <a:t>подошли множества и реализованная для них функция .</a:t>
+              <a:t>	Для этой цели идеально подошли множества и реализованная для них функция .</a:t>
             </a:r>
             <a:r>
               <a:rPr lang="en-US" dirty="0" smtClean="0"/>
@@ -3491,11 +3454,7 @@
             </a:r>
             <a:r>
               <a:rPr lang="ru-RU" dirty="0" smtClean="0"/>
-              <a:t>По</a:t>
-            </a:r>
-            <a:r>
-              <a:rPr lang="ru-RU" dirty="0" smtClean="0"/>
-              <a:t>сле просмотра </a:t>
+              <a:t>После просмотра </a:t>
             </a:r>
             <a:r>
               <a:rPr lang="en-US" dirty="0" smtClean="0"/>
@@ -3618,11 +3577,7 @@
             </a:r>
             <a:r>
               <a:rPr lang="ru-RU" dirty="0" smtClean="0"/>
-              <a:t>адание </a:t>
-            </a:r>
-            <a:r>
-              <a:rPr lang="ru-RU" dirty="0" smtClean="0"/>
-              <a:t>1</a:t>
+              <a:t>адание 1</a:t>
             </a:r>
             <a:endParaRPr lang="ru-RU" dirty="0"/>
           </a:p>
@@ -3755,6 +3710,140 @@
           <a:lstStyle/>
           <a:p>
             <a:r>
+              <a:rPr lang="ru-RU" dirty="0" err="1" smtClean="0"/>
+              <a:t>Багфикс</a:t>
+            </a:r>
+            <a:endParaRPr lang="ru-RU" dirty="0"/>
+          </a:p>
+        </p:txBody>
+      </p:sp>
+      <p:pic>
+        <p:nvPicPr>
+          <p:cNvPr id="4" name="Рисунок 3"/>
+          <p:cNvPicPr>
+            <a:picLocks noChangeAspect="1"/>
+          </p:cNvPicPr>
+          <p:nvPr/>
+        </p:nvPicPr>
+        <p:blipFill>
+          <a:blip r:embed="rId2"/>
+          <a:stretch>
+            <a:fillRect/>
+          </a:stretch>
+        </p:blipFill>
+        <p:spPr>
+          <a:xfrm>
+            <a:off x="1422286" y="3016251"/>
+            <a:ext cx="9347427" cy="3454671"/>
+          </a:xfrm>
+          <a:prstGeom prst="rect">
+            <a:avLst/>
+          </a:prstGeom>
+          <a:ln w="38100" cap="sq">
+            <a:solidFill>
+              <a:srgbClr val="000000"/>
+            </a:solidFill>
+            <a:prstDash val="solid"/>
+            <a:miter lim="800000"/>
+          </a:ln>
+          <a:effectLst>
+            <a:outerShdw blurRad="50800" dist="38100" dir="2700000" algn="tl" rotWithShape="0">
+              <a:srgbClr val="000000">
+                <a:alpha val="43000"/>
+              </a:srgbClr>
+            </a:outerShdw>
+          </a:effectLst>
+        </p:spPr>
+      </p:pic>
+      <p:sp>
+        <p:nvSpPr>
+          <p:cNvPr id="5" name="Объект 2"/>
+          <p:cNvSpPr>
+            <a:spLocks noGrp="1"/>
+          </p:cNvSpPr>
+          <p:nvPr>
+            <p:ph idx="1"/>
+          </p:nvPr>
+        </p:nvSpPr>
+        <p:spPr>
+          <a:xfrm>
+            <a:off x="400594" y="1690688"/>
+            <a:ext cx="10953206" cy="4351338"/>
+          </a:xfrm>
+        </p:spPr>
+        <p:txBody>
+          <a:bodyPr/>
+          <a:lstStyle/>
+          <a:p>
+            <a:pPr marL="457200" lvl="1" indent="0">
+              <a:buNone/>
+            </a:pPr>
+            <a:r>
+              <a:rPr lang="ru-RU" dirty="0" smtClean="0"/>
+              <a:t>	</a:t>
+            </a:r>
+            <a:r>
+              <a:rPr lang="ru-RU" sz="2800" dirty="0" smtClean="0"/>
+              <a:t>В 4 и 5 задании я неправильно указал с какого по какой символы являются годом. (Да, надо было </a:t>
+            </a:r>
+            <a:r>
+              <a:rPr lang="ru-RU" sz="2800" dirty="0" smtClean="0"/>
+              <a:t>работать с датой не как со строкой</a:t>
+            </a:r>
+            <a:r>
+              <a:rPr lang="ru-RU" sz="2800" dirty="0" smtClean="0"/>
+              <a:t>)</a:t>
+            </a:r>
+            <a:endParaRPr lang="ru-RU" sz="2800" dirty="0"/>
+          </a:p>
+        </p:txBody>
+      </p:sp>
+    </p:spTree>
+    <p:extLst>
+      <p:ext uri="{BB962C8B-B14F-4D97-AF65-F5344CB8AC3E}">
+        <p14:creationId xmlns:p14="http://schemas.microsoft.com/office/powerpoint/2010/main" val="2271512338"/>
+      </p:ext>
+    </p:extLst>
+  </p:cSld>
+  <p:clrMapOvr>
+    <a:masterClrMapping/>
+  </p:clrMapOvr>
+</p:sld>
+</file>
+
+<file path=ppt/slides/slide15.xml><?xml version="1.0" encoding="utf-8"?>
+<p:sld xmlns:a="http://schemas.openxmlformats.org/drawingml/2006/main" xmlns:r="http://schemas.openxmlformats.org/officeDocument/2006/relationships" xmlns:p="http://schemas.openxmlformats.org/presentationml/2006/main">
+  <p:cSld>
+    <p:spTree>
+      <p:nvGrpSpPr>
+        <p:cNvPr id="1" name=""/>
+        <p:cNvGrpSpPr/>
+        <p:nvPr/>
+      </p:nvGrpSpPr>
+      <p:grpSpPr>
+        <a:xfrm>
+          <a:off x="0" y="0"/>
+          <a:ext cx="0" cy="0"/>
+          <a:chOff x="0" y="0"/>
+          <a:chExt cx="0" cy="0"/>
+        </a:xfrm>
+      </p:grpSpPr>
+      <p:sp>
+        <p:nvSpPr>
+          <p:cNvPr id="2" name="Заголовок 1"/>
+          <p:cNvSpPr>
+            <a:spLocks noGrp="1"/>
+          </p:cNvSpPr>
+          <p:nvPr>
+            <p:ph type="title"/>
+          </p:nvPr>
+        </p:nvSpPr>
+        <p:spPr/>
+        <p:txBody>
+          <a:bodyPr/>
+          <a:lstStyle/>
+          <a:p>
+            <a:r>
               <a:rPr lang="ru-RU" dirty="0" smtClean="0"/>
               <a:t>Доп. задание 2</a:t>
             </a:r>
@@ -3842,8 +3931,8 @@
         </p:blipFill>
         <p:spPr>
           <a:xfrm>
-            <a:off x="5639935" y="3317965"/>
-            <a:ext cx="5713865" cy="3137671"/>
+            <a:off x="6692583" y="3436032"/>
+            <a:ext cx="5036774" cy="2765858"/>
           </a:xfrm>
           <a:prstGeom prst="rect">
             <a:avLst/>
@@ -4094,103 +4183,24 @@
           </a:p>
         </p:txBody>
       </p:sp>
-    </p:spTree>
-    <p:extLst>
-      <p:ext uri="{BB962C8B-B14F-4D97-AF65-F5344CB8AC3E}">
-        <p14:creationId xmlns:p14="http://schemas.microsoft.com/office/powerpoint/2010/main" val="4065181530"/>
-      </p:ext>
-    </p:extLst>
-  </p:cSld>
-  <p:clrMapOvr>
-    <a:masterClrMapping/>
-  </p:clrMapOvr>
-</p:sld>
-</file>
-
-<file path=ppt/slides/slide15.xml><?xml version="1.0" encoding="utf-8"?>
-<p:sld xmlns:a="http://schemas.openxmlformats.org/drawingml/2006/main" xmlns:r="http://schemas.openxmlformats.org/officeDocument/2006/relationships" xmlns:p="http://schemas.openxmlformats.org/presentationml/2006/main">
-  <p:cSld>
-    <p:spTree>
-      <p:nvGrpSpPr>
-        <p:cNvPr id="1" name=""/>
-        <p:cNvGrpSpPr/>
-        <p:nvPr/>
-      </p:nvGrpSpPr>
-      <p:grpSpPr>
-        <a:xfrm>
-          <a:off x="0" y="0"/>
-          <a:ext cx="0" cy="0"/>
-          <a:chOff x="0" y="0"/>
-          <a:chExt cx="0" cy="0"/>
-        </a:xfrm>
-      </p:grpSpPr>
-      <p:sp>
-        <p:nvSpPr>
-          <p:cNvPr id="2" name="Заголовок 1"/>
-          <p:cNvSpPr>
-            <a:spLocks noGrp="1"/>
-          </p:cNvSpPr>
-          <p:nvPr>
-            <p:ph type="title"/>
-          </p:nvPr>
-        </p:nvSpPr>
-        <p:spPr/>
-        <p:txBody>
-          <a:bodyPr/>
-          <a:lstStyle/>
-          <a:p>
-            <a:r>
-              <a:rPr lang="ru-RU" dirty="0" smtClean="0"/>
-              <a:t>Доп. задание 2</a:t>
-            </a:r>
-            <a:endParaRPr lang="ru-RU" dirty="0"/>
-          </a:p>
-        </p:txBody>
-      </p:sp>
-      <p:sp>
-        <p:nvSpPr>
-          <p:cNvPr id="3" name="Объект 2"/>
-          <p:cNvSpPr>
-            <a:spLocks noGrp="1"/>
-          </p:cNvSpPr>
-          <p:nvPr>
-            <p:ph idx="1"/>
-          </p:nvPr>
-        </p:nvSpPr>
-        <p:spPr/>
-        <p:txBody>
-          <a:bodyPr/>
-          <a:lstStyle/>
-          <a:p>
-            <a:pPr marL="0" indent="0">
-              <a:buNone/>
-            </a:pPr>
-            <a:r>
-              <a:rPr lang="ru-RU" dirty="0" smtClean="0"/>
-              <a:t>	</a:t>
-            </a:r>
-            <a:endParaRPr lang="ru-RU" dirty="0"/>
-          </a:p>
-        </p:txBody>
-      </p:sp>
       <p:pic>
         <p:nvPicPr>
-          <p:cNvPr id="4" name="Рисунок 3"/>
+          <p:cNvPr id="6" name="Рисунок 5"/>
           <p:cNvPicPr>
             <a:picLocks noChangeAspect="1"/>
           </p:cNvPicPr>
           <p:nvPr/>
         </p:nvPicPr>
         <p:blipFill>
-          <a:blip r:embed="rId2"/>
+          <a:blip r:embed="rId4"/>
           <a:stretch>
             <a:fillRect/>
           </a:stretch>
         </p:blipFill>
         <p:spPr>
           <a:xfrm>
-            <a:off x="5939654" y="491989"/>
-            <a:ext cx="5414146" cy="2532336"/>
+            <a:off x="986950" y="3906952"/>
+            <a:ext cx="5048499" cy="2735416"/>
           </a:xfrm>
           <a:prstGeom prst="rect">
             <a:avLst/>
@@ -4211,44 +4221,85 @@
           </a:effectLst>
         </p:spPr>
       </p:pic>
-      <p:pic>
-        <p:nvPicPr>
-          <p:cNvPr id="5" name="Рисунок 4"/>
-          <p:cNvPicPr>
-            <a:picLocks noChangeAspect="1"/>
-          </p:cNvPicPr>
-          <p:nvPr/>
-        </p:nvPicPr>
-        <p:blipFill>
-          <a:blip r:embed="rId3"/>
-          <a:stretch>
-            <a:fillRect/>
-          </a:stretch>
-        </p:blipFill>
-        <p:spPr>
-          <a:xfrm>
-            <a:off x="5639935" y="3317965"/>
-            <a:ext cx="5713865" cy="3137671"/>
-          </a:xfrm>
-          <a:prstGeom prst="rect">
-            <a:avLst/>
-          </a:prstGeom>
-          <a:ln w="38100" cap="sq">
-            <a:solidFill>
-              <a:srgbClr val="000000"/>
-            </a:solidFill>
-            <a:prstDash val="solid"/>
-            <a:miter lim="800000"/>
-          </a:ln>
-          <a:effectLst>
-            <a:outerShdw blurRad="50800" dist="38100" dir="2700000" algn="tl" rotWithShape="0">
-              <a:srgbClr val="000000">
-                <a:alpha val="43000"/>
-              </a:srgbClr>
-            </a:outerShdw>
-          </a:effectLst>
-        </p:spPr>
-      </p:pic>
+    </p:spTree>
+    <p:extLst>
+      <p:ext uri="{BB962C8B-B14F-4D97-AF65-F5344CB8AC3E}">
+        <p14:creationId xmlns:p14="http://schemas.microsoft.com/office/powerpoint/2010/main" val="4065181530"/>
+      </p:ext>
+    </p:extLst>
+  </p:cSld>
+  <p:clrMapOvr>
+    <a:masterClrMapping/>
+  </p:clrMapOvr>
+</p:sld>
+</file>
+
+<file path=ppt/slides/slide16.xml><?xml version="1.0" encoding="utf-8"?>
+<p:sld xmlns:a="http://schemas.openxmlformats.org/drawingml/2006/main" xmlns:r="http://schemas.openxmlformats.org/officeDocument/2006/relationships" xmlns:p="http://schemas.openxmlformats.org/presentationml/2006/main">
+  <p:cSld>
+    <p:spTree>
+      <p:nvGrpSpPr>
+        <p:cNvPr id="1" name=""/>
+        <p:cNvGrpSpPr/>
+        <p:nvPr/>
+      </p:nvGrpSpPr>
+      <p:grpSpPr>
+        <a:xfrm>
+          <a:off x="0" y="0"/>
+          <a:ext cx="0" cy="0"/>
+          <a:chOff x="0" y="0"/>
+          <a:chExt cx="0" cy="0"/>
+        </a:xfrm>
+      </p:grpSpPr>
+      <p:sp>
+        <p:nvSpPr>
+          <p:cNvPr id="2" name="Заголовок 1"/>
+          <p:cNvSpPr>
+            <a:spLocks noGrp="1"/>
+          </p:cNvSpPr>
+          <p:nvPr>
+            <p:ph type="title"/>
+          </p:nvPr>
+        </p:nvSpPr>
+        <p:spPr/>
+        <p:txBody>
+          <a:bodyPr/>
+          <a:lstStyle/>
+          <a:p>
+            <a:r>
+              <a:rPr lang="ru-RU" dirty="0" smtClean="0"/>
+              <a:t>Доп. задание 2</a:t>
+            </a:r>
+            <a:endParaRPr lang="ru-RU" dirty="0"/>
+          </a:p>
+        </p:txBody>
+      </p:sp>
+      <p:sp>
+        <p:nvSpPr>
+          <p:cNvPr id="3" name="Объект 2"/>
+          <p:cNvSpPr>
+            <a:spLocks noGrp="1"/>
+          </p:cNvSpPr>
+          <p:nvPr>
+            <p:ph idx="1"/>
+          </p:nvPr>
+        </p:nvSpPr>
+        <p:spPr/>
+        <p:txBody>
+          <a:bodyPr/>
+          <a:lstStyle/>
+          <a:p>
+            <a:pPr marL="0" indent="0">
+              <a:buNone/>
+            </a:pPr>
+            <a:r>
+              <a:rPr lang="ru-RU" dirty="0" smtClean="0"/>
+              <a:t>	</a:t>
+            </a:r>
+            <a:endParaRPr lang="ru-RU" dirty="0"/>
+          </a:p>
+        </p:txBody>
+      </p:sp>
       <p:sp>
         <p:nvSpPr>
           <p:cNvPr id="7" name="Объект 2"/>
@@ -4259,8 +4310,8 @@
         </p:nvSpPr>
         <p:spPr>
           <a:xfrm>
-            <a:off x="400594" y="1825625"/>
-            <a:ext cx="5399315" cy="4351338"/>
+            <a:off x="400593" y="1825625"/>
+            <a:ext cx="10380618" cy="4351338"/>
           </a:xfrm>
           <a:prstGeom prst="rect">
             <a:avLst/>
@@ -4445,27 +4496,19 @@
             </a:r>
             <a:r>
               <a:rPr lang="ru-RU" sz="2800" dirty="0" smtClean="0"/>
-              <a:t>Для начала я попробовал найти готовые решения. Подключать </a:t>
+              <a:t>Теперь хотелось бы все это красиво вывести. Пришлось немного </a:t>
+            </a:r>
+            <a:r>
+              <a:rPr lang="ru-RU" sz="2800" dirty="0" err="1" smtClean="0"/>
+              <a:t>погуглить</a:t>
+            </a:r>
+            <a:r>
+              <a:rPr lang="ru-RU" sz="2800" dirty="0" smtClean="0"/>
+              <a:t> про </a:t>
             </a:r>
             <a:r>
               <a:rPr lang="en-US" sz="2800" dirty="0" err="1" smtClean="0"/>
-              <a:t>Numpy</a:t>
-            </a:r>
-            <a:r>
-              <a:rPr lang="en-US" sz="2800" dirty="0" smtClean="0"/>
-              <a:t> </a:t>
-            </a:r>
-            <a:r>
-              <a:rPr lang="ru-RU" sz="2800" dirty="0" smtClean="0"/>
-              <a:t>или </a:t>
-            </a:r>
-            <a:r>
-              <a:rPr lang="en-US" sz="2800" dirty="0" smtClean="0"/>
-              <a:t>Pandas </a:t>
-            </a:r>
-            <a:r>
-              <a:rPr lang="ru-RU" sz="2800" dirty="0" smtClean="0"/>
-              <a:t>мне не хотелось</a:t>
+              <a:t>csv.DictWriter</a:t>
             </a:r>
             <a:r>
               <a:rPr lang="en-US" sz="2800" dirty="0" smtClean="0"/>
@@ -4473,16 +4516,545 @@
             </a:r>
             <a:r>
               <a:rPr lang="ru-RU" sz="2800" dirty="0" smtClean="0"/>
-              <a:t>поэтому я написал свой вариант.</a:t>
+              <a:t>однако результат того стоил.</a:t>
             </a:r>
             <a:endParaRPr lang="ru-RU" sz="2800" dirty="0"/>
           </a:p>
         </p:txBody>
       </p:sp>
+      <p:pic>
+        <p:nvPicPr>
+          <p:cNvPr id="9" name="Рисунок 8"/>
+          <p:cNvPicPr>
+            <a:picLocks noChangeAspect="1"/>
+          </p:cNvPicPr>
+          <p:nvPr/>
+        </p:nvPicPr>
+        <p:blipFill>
+          <a:blip r:embed="rId2"/>
+          <a:stretch>
+            <a:fillRect/>
+          </a:stretch>
+        </p:blipFill>
+        <p:spPr>
+          <a:xfrm>
+            <a:off x="1027454" y="3257006"/>
+            <a:ext cx="10508413" cy="3252604"/>
+          </a:xfrm>
+          <a:prstGeom prst="rect">
+            <a:avLst/>
+          </a:prstGeom>
+          <a:ln w="38100" cap="sq">
+            <a:solidFill>
+              <a:srgbClr val="000000"/>
+            </a:solidFill>
+            <a:prstDash val="solid"/>
+            <a:miter lim="800000"/>
+          </a:ln>
+          <a:effectLst>
+            <a:outerShdw blurRad="50800" dist="38100" dir="2700000" algn="tl" rotWithShape="0">
+              <a:srgbClr val="000000">
+                <a:alpha val="43000"/>
+              </a:srgbClr>
+            </a:outerShdw>
+          </a:effectLst>
+        </p:spPr>
+      </p:pic>
     </p:spTree>
     <p:extLst>
       <p:ext uri="{BB962C8B-B14F-4D97-AF65-F5344CB8AC3E}">
         <p14:creationId xmlns:p14="http://schemas.microsoft.com/office/powerpoint/2010/main" val="3269457205"/>
+      </p:ext>
+    </p:extLst>
+  </p:cSld>
+  <p:clrMapOvr>
+    <a:masterClrMapping/>
+  </p:clrMapOvr>
+</p:sld>
+</file>
+
+<file path=ppt/slides/slide17.xml><?xml version="1.0" encoding="utf-8"?>
+<p:sld xmlns:a="http://schemas.openxmlformats.org/drawingml/2006/main" xmlns:r="http://schemas.openxmlformats.org/officeDocument/2006/relationships" xmlns:p="http://schemas.openxmlformats.org/presentationml/2006/main">
+  <p:cSld>
+    <p:spTree>
+      <p:nvGrpSpPr>
+        <p:cNvPr id="1" name=""/>
+        <p:cNvGrpSpPr/>
+        <p:nvPr/>
+      </p:nvGrpSpPr>
+      <p:grpSpPr>
+        <a:xfrm>
+          <a:off x="0" y="0"/>
+          <a:ext cx="0" cy="0"/>
+          <a:chOff x="0" y="0"/>
+          <a:chExt cx="0" cy="0"/>
+        </a:xfrm>
+      </p:grpSpPr>
+      <p:sp>
+        <p:nvSpPr>
+          <p:cNvPr id="3" name="Объект 2"/>
+          <p:cNvSpPr>
+            <a:spLocks noGrp="1"/>
+          </p:cNvSpPr>
+          <p:nvPr>
+            <p:ph idx="1"/>
+          </p:nvPr>
+        </p:nvSpPr>
+        <p:spPr>
+          <a:xfrm>
+            <a:off x="350520" y="1825625"/>
+            <a:ext cx="3768634" cy="4351338"/>
+          </a:xfrm>
+        </p:spPr>
+        <p:txBody>
+          <a:bodyPr/>
+          <a:lstStyle/>
+          <a:p>
+            <a:pPr marL="0" indent="0">
+              <a:buNone/>
+            </a:pPr>
+            <a:r>
+              <a:rPr lang="ru-RU" dirty="0" smtClean="0"/>
+              <a:t>	На этом останавливаюсь, делаю крайний </a:t>
+            </a:r>
+            <a:r>
+              <a:rPr lang="ru-RU" dirty="0" err="1" smtClean="0"/>
+              <a:t>коммит</a:t>
+            </a:r>
+            <a:r>
+              <a:rPr lang="ru-RU" dirty="0" smtClean="0"/>
+              <a:t> и пушу на </a:t>
+            </a:r>
+            <a:r>
+              <a:rPr lang="en-US" dirty="0" smtClean="0"/>
+              <a:t>GitHub</a:t>
+            </a:r>
+            <a:endParaRPr lang="ru-RU" dirty="0"/>
+          </a:p>
+        </p:txBody>
+      </p:sp>
+      <p:sp>
+        <p:nvSpPr>
+          <p:cNvPr id="5" name="Заголовок 1"/>
+          <p:cNvSpPr>
+            <a:spLocks noGrp="1"/>
+          </p:cNvSpPr>
+          <p:nvPr>
+            <p:ph type="title"/>
+          </p:nvPr>
+        </p:nvSpPr>
+        <p:spPr/>
+        <p:txBody>
+          <a:bodyPr/>
+          <a:lstStyle/>
+          <a:p>
+            <a:r>
+              <a:rPr lang="ru-RU" dirty="0" smtClean="0"/>
+              <a:t>Доп. задание 2</a:t>
+            </a:r>
+            <a:endParaRPr lang="ru-RU" dirty="0"/>
+          </a:p>
+        </p:txBody>
+      </p:sp>
+      <p:pic>
+        <p:nvPicPr>
+          <p:cNvPr id="6" name="Рисунок 5"/>
+          <p:cNvPicPr>
+            <a:picLocks noChangeAspect="1"/>
+          </p:cNvPicPr>
+          <p:nvPr/>
+        </p:nvPicPr>
+        <p:blipFill rotWithShape="1">
+          <a:blip r:embed="rId2"/>
+          <a:srcRect r="10362"/>
+          <a:stretch/>
+        </p:blipFill>
+        <p:spPr>
+          <a:xfrm>
+            <a:off x="4222977" y="1825625"/>
+            <a:ext cx="7533595" cy="3745804"/>
+          </a:xfrm>
+          <a:prstGeom prst="rect">
+            <a:avLst/>
+          </a:prstGeom>
+          <a:ln w="38100" cap="sq">
+            <a:solidFill>
+              <a:srgbClr val="000000"/>
+            </a:solidFill>
+            <a:prstDash val="solid"/>
+            <a:miter lim="800000"/>
+          </a:ln>
+          <a:effectLst>
+            <a:outerShdw blurRad="50800" dist="38100" dir="2700000" algn="tl" rotWithShape="0">
+              <a:srgbClr val="000000">
+                <a:alpha val="43000"/>
+              </a:srgbClr>
+            </a:outerShdw>
+          </a:effectLst>
+        </p:spPr>
+      </p:pic>
+      <p:pic>
+        <p:nvPicPr>
+          <p:cNvPr id="7" name="Рисунок 6"/>
+          <p:cNvPicPr>
+            <a:picLocks noChangeAspect="1"/>
+          </p:cNvPicPr>
+          <p:nvPr/>
+        </p:nvPicPr>
+        <p:blipFill rotWithShape="1">
+          <a:blip r:embed="rId3">
+            <a:extLst>
+              <a:ext uri="{28A0092B-C50C-407E-A947-70E740481C1C}">
+                <a14:useLocalDpi xmlns:a14="http://schemas.microsoft.com/office/drawing/2010/main" val="0"/>
+              </a:ext>
+            </a:extLst>
+          </a:blip>
+          <a:srcRect b="5996"/>
+          <a:stretch/>
+        </p:blipFill>
+        <p:spPr>
+          <a:xfrm>
+            <a:off x="1509486" y="3687762"/>
+            <a:ext cx="2034903" cy="2582409"/>
+          </a:xfrm>
+          <a:prstGeom prst="rect">
+            <a:avLst/>
+          </a:prstGeom>
+        </p:spPr>
+      </p:pic>
+    </p:spTree>
+    <p:extLst>
+      <p:ext uri="{BB962C8B-B14F-4D97-AF65-F5344CB8AC3E}">
+        <p14:creationId xmlns:p14="http://schemas.microsoft.com/office/powerpoint/2010/main" val="2518146005"/>
+      </p:ext>
+    </p:extLst>
+  </p:cSld>
+  <p:clrMapOvr>
+    <a:masterClrMapping/>
+  </p:clrMapOvr>
+</p:sld>
+</file>
+
+<file path=ppt/slides/slide18.xml><?xml version="1.0" encoding="utf-8"?>
+<p:sld xmlns:a="http://schemas.openxmlformats.org/drawingml/2006/main" xmlns:r="http://schemas.openxmlformats.org/officeDocument/2006/relationships" xmlns:p="http://schemas.openxmlformats.org/presentationml/2006/main">
+  <p:cSld>
+    <p:spTree>
+      <p:nvGrpSpPr>
+        <p:cNvPr id="1" name=""/>
+        <p:cNvGrpSpPr/>
+        <p:nvPr/>
+      </p:nvGrpSpPr>
+      <p:grpSpPr>
+        <a:xfrm>
+          <a:off x="0" y="0"/>
+          <a:ext cx="0" cy="0"/>
+          <a:chOff x="0" y="0"/>
+          <a:chExt cx="0" cy="0"/>
+        </a:xfrm>
+      </p:grpSpPr>
+      <p:sp>
+        <p:nvSpPr>
+          <p:cNvPr id="2" name="Заголовок 1"/>
+          <p:cNvSpPr>
+            <a:spLocks noGrp="1"/>
+          </p:cNvSpPr>
+          <p:nvPr>
+            <p:ph type="title"/>
+          </p:nvPr>
+        </p:nvSpPr>
+        <p:spPr/>
+        <p:txBody>
+          <a:bodyPr/>
+          <a:lstStyle/>
+          <a:p>
+            <a:r>
+              <a:rPr lang="ru-RU" dirty="0" smtClean="0"/>
+              <a:t>Вывод</a:t>
+            </a:r>
+            <a:endParaRPr lang="ru-RU" dirty="0"/>
+          </a:p>
+        </p:txBody>
+      </p:sp>
+      <p:pic>
+        <p:nvPicPr>
+          <p:cNvPr id="4" name="Объект 3"/>
+          <p:cNvPicPr>
+            <a:picLocks noGrp="1" noChangeAspect="1"/>
+          </p:cNvPicPr>
+          <p:nvPr>
+            <p:ph idx="1"/>
+          </p:nvPr>
+        </p:nvPicPr>
+        <p:blipFill rotWithShape="1">
+          <a:blip r:embed="rId2">
+            <a:extLst>
+              <a:ext uri="{28A0092B-C50C-407E-A947-70E740481C1C}">
+                <a14:useLocalDpi xmlns:a14="http://schemas.microsoft.com/office/drawing/2010/main" val="0"/>
+              </a:ext>
+            </a:extLst>
+          </a:blip>
+          <a:srcRect b="4684"/>
+          <a:stretch/>
+        </p:blipFill>
+        <p:spPr>
+          <a:xfrm>
+            <a:off x="7648303" y="1568768"/>
+            <a:ext cx="3810000" cy="3813129"/>
+          </a:xfrm>
+        </p:spPr>
+      </p:pic>
+      <p:sp>
+        <p:nvSpPr>
+          <p:cNvPr id="5" name="Объект 2"/>
+          <p:cNvSpPr txBox="1">
+            <a:spLocks/>
+          </p:cNvSpPr>
+          <p:nvPr/>
+        </p:nvSpPr>
+        <p:spPr>
+          <a:xfrm>
+            <a:off x="400593" y="1825625"/>
+            <a:ext cx="6583681" cy="4351338"/>
+          </a:xfrm>
+          <a:prstGeom prst="rect">
+            <a:avLst/>
+          </a:prstGeom>
+        </p:spPr>
+        <p:txBody>
+          <a:bodyPr vert="horz" lIns="91440" tIns="45720" rIns="91440" bIns="45720" rtlCol="0">
+            <a:normAutofit/>
+          </a:bodyPr>
+          <a:lstStyle>
+            <a:lvl1pPr marL="228600" indent="-228600" algn="l" defTabSz="914400" rtl="0" eaLnBrk="1" latinLnBrk="0" hangingPunct="1">
+              <a:lnSpc>
+                <a:spcPct val="90000"/>
+              </a:lnSpc>
+              <a:spcBef>
+                <a:spcPts val="1000"/>
+              </a:spcBef>
+              <a:buFont typeface="Arial" panose="020B0604020202020204" pitchFamily="34" charset="0"/>
+              <a:buChar char="•"/>
+              <a:defRPr sz="2800" kern="1200">
+                <a:solidFill>
+                  <a:schemeClr val="tx1"/>
+                </a:solidFill>
+                <a:latin typeface="+mn-lt"/>
+                <a:ea typeface="+mn-ea"/>
+                <a:cs typeface="+mn-cs"/>
+              </a:defRPr>
+            </a:lvl1pPr>
+            <a:lvl2pPr marL="685800" indent="-228600" algn="l" defTabSz="914400" rtl="0" eaLnBrk="1" latinLnBrk="0" hangingPunct="1">
+              <a:lnSpc>
+                <a:spcPct val="90000"/>
+              </a:lnSpc>
+              <a:spcBef>
+                <a:spcPts val="500"/>
+              </a:spcBef>
+              <a:buFont typeface="Arial" panose="020B0604020202020204" pitchFamily="34" charset="0"/>
+              <a:buChar char="•"/>
+              <a:defRPr sz="2400" kern="1200">
+                <a:solidFill>
+                  <a:schemeClr val="tx1"/>
+                </a:solidFill>
+                <a:latin typeface="+mn-lt"/>
+                <a:ea typeface="+mn-ea"/>
+                <a:cs typeface="+mn-cs"/>
+              </a:defRPr>
+            </a:lvl2pPr>
+            <a:lvl3pPr marL="1143000" indent="-228600" algn="l" defTabSz="914400" rtl="0" eaLnBrk="1" latinLnBrk="0" hangingPunct="1">
+              <a:lnSpc>
+                <a:spcPct val="90000"/>
+              </a:lnSpc>
+              <a:spcBef>
+                <a:spcPts val="500"/>
+              </a:spcBef>
+              <a:buFont typeface="Arial" panose="020B0604020202020204" pitchFamily="34" charset="0"/>
+              <a:buChar char="•"/>
+              <a:defRPr sz="2000" kern="1200">
+                <a:solidFill>
+                  <a:schemeClr val="tx1"/>
+                </a:solidFill>
+                <a:latin typeface="+mn-lt"/>
+                <a:ea typeface="+mn-ea"/>
+                <a:cs typeface="+mn-cs"/>
+              </a:defRPr>
+            </a:lvl3pPr>
+            <a:lvl4pPr marL="1600200" indent="-228600" algn="l" defTabSz="914400" rtl="0" eaLnBrk="1" latinLnBrk="0" hangingPunct="1">
+              <a:lnSpc>
+                <a:spcPct val="90000"/>
+              </a:lnSpc>
+              <a:spcBef>
+                <a:spcPts val="500"/>
+              </a:spcBef>
+              <a:buFont typeface="Arial" panose="020B0604020202020204" pitchFamily="34" charset="0"/>
+              <a:buChar char="•"/>
+              <a:defRPr sz="1800" kern="1200">
+                <a:solidFill>
+                  <a:schemeClr val="tx1"/>
+                </a:solidFill>
+                <a:latin typeface="+mn-lt"/>
+                <a:ea typeface="+mn-ea"/>
+                <a:cs typeface="+mn-cs"/>
+              </a:defRPr>
+            </a:lvl4pPr>
+            <a:lvl5pPr marL="2057400" indent="-228600" algn="l" defTabSz="914400" rtl="0" eaLnBrk="1" latinLnBrk="0" hangingPunct="1">
+              <a:lnSpc>
+                <a:spcPct val="90000"/>
+              </a:lnSpc>
+              <a:spcBef>
+                <a:spcPts val="500"/>
+              </a:spcBef>
+              <a:buFont typeface="Arial" panose="020B0604020202020204" pitchFamily="34" charset="0"/>
+              <a:buChar char="•"/>
+              <a:defRPr sz="1800" kern="1200">
+                <a:solidFill>
+                  <a:schemeClr val="tx1"/>
+                </a:solidFill>
+                <a:latin typeface="+mn-lt"/>
+                <a:ea typeface="+mn-ea"/>
+                <a:cs typeface="+mn-cs"/>
+              </a:defRPr>
+            </a:lvl5pPr>
+            <a:lvl6pPr marL="2514600" indent="-228600" algn="l" defTabSz="914400" rtl="0" eaLnBrk="1" latinLnBrk="0" hangingPunct="1">
+              <a:lnSpc>
+                <a:spcPct val="90000"/>
+              </a:lnSpc>
+              <a:spcBef>
+                <a:spcPts val="500"/>
+              </a:spcBef>
+              <a:buFont typeface="Arial" panose="020B0604020202020204" pitchFamily="34" charset="0"/>
+              <a:buChar char="•"/>
+              <a:defRPr sz="1800" kern="1200">
+                <a:solidFill>
+                  <a:schemeClr val="tx1"/>
+                </a:solidFill>
+                <a:latin typeface="+mn-lt"/>
+                <a:ea typeface="+mn-ea"/>
+                <a:cs typeface="+mn-cs"/>
+              </a:defRPr>
+            </a:lvl6pPr>
+            <a:lvl7pPr marL="2971800" indent="-228600" algn="l" defTabSz="914400" rtl="0" eaLnBrk="1" latinLnBrk="0" hangingPunct="1">
+              <a:lnSpc>
+                <a:spcPct val="90000"/>
+              </a:lnSpc>
+              <a:spcBef>
+                <a:spcPts val="500"/>
+              </a:spcBef>
+              <a:buFont typeface="Arial" panose="020B0604020202020204" pitchFamily="34" charset="0"/>
+              <a:buChar char="•"/>
+              <a:defRPr sz="1800" kern="1200">
+                <a:solidFill>
+                  <a:schemeClr val="tx1"/>
+                </a:solidFill>
+                <a:latin typeface="+mn-lt"/>
+                <a:ea typeface="+mn-ea"/>
+                <a:cs typeface="+mn-cs"/>
+              </a:defRPr>
+            </a:lvl7pPr>
+            <a:lvl8pPr marL="3429000" indent="-228600" algn="l" defTabSz="914400" rtl="0" eaLnBrk="1" latinLnBrk="0" hangingPunct="1">
+              <a:lnSpc>
+                <a:spcPct val="90000"/>
+              </a:lnSpc>
+              <a:spcBef>
+                <a:spcPts val="500"/>
+              </a:spcBef>
+              <a:buFont typeface="Arial" panose="020B0604020202020204" pitchFamily="34" charset="0"/>
+              <a:buChar char="•"/>
+              <a:defRPr sz="1800" kern="1200">
+                <a:solidFill>
+                  <a:schemeClr val="tx1"/>
+                </a:solidFill>
+                <a:latin typeface="+mn-lt"/>
+                <a:ea typeface="+mn-ea"/>
+                <a:cs typeface="+mn-cs"/>
+              </a:defRPr>
+            </a:lvl8pPr>
+            <a:lvl9pPr marL="3886200" indent="-228600" algn="l" defTabSz="914400" rtl="0" eaLnBrk="1" latinLnBrk="0" hangingPunct="1">
+              <a:lnSpc>
+                <a:spcPct val="90000"/>
+              </a:lnSpc>
+              <a:spcBef>
+                <a:spcPts val="500"/>
+              </a:spcBef>
+              <a:buFont typeface="Arial" panose="020B0604020202020204" pitchFamily="34" charset="0"/>
+              <a:buChar char="•"/>
+              <a:defRPr sz="1800" kern="1200">
+                <a:solidFill>
+                  <a:schemeClr val="tx1"/>
+                </a:solidFill>
+                <a:latin typeface="+mn-lt"/>
+                <a:ea typeface="+mn-ea"/>
+                <a:cs typeface="+mn-cs"/>
+              </a:defRPr>
+            </a:lvl9pPr>
+          </a:lstStyle>
+          <a:p>
+            <a:pPr marL="457200" lvl="1" indent="0">
+              <a:buFont typeface="Arial" panose="020B0604020202020204" pitchFamily="34" charset="0"/>
+              <a:buNone/>
+            </a:pPr>
+            <a:r>
+              <a:rPr lang="ru-RU" dirty="0" smtClean="0"/>
+              <a:t>	</a:t>
+            </a:r>
+            <a:r>
+              <a:rPr lang="en-US" sz="2800" dirty="0" smtClean="0"/>
+              <a:t>Python </a:t>
+            </a:r>
+            <a:r>
+              <a:rPr lang="ru-RU" sz="2800" dirty="0" smtClean="0"/>
+              <a:t>оказался достаточно понятным и приятным в работе.</a:t>
+            </a:r>
+          </a:p>
+          <a:p>
+            <a:pPr marL="457200" lvl="1" indent="0">
+              <a:buFont typeface="Arial" panose="020B0604020202020204" pitchFamily="34" charset="0"/>
+              <a:buNone/>
+            </a:pPr>
+            <a:r>
+              <a:rPr lang="ru-RU" sz="2800" dirty="0" smtClean="0"/>
+              <a:t>	После </a:t>
+            </a:r>
+            <a:r>
+              <a:rPr lang="en-US" sz="2800" dirty="0" smtClean="0"/>
+              <a:t>Java </a:t>
+            </a:r>
+            <a:r>
+              <a:rPr lang="ru-RU" sz="2800" dirty="0" smtClean="0"/>
+              <a:t>язык несколько непривычен, так как не всегда очевидно что происходит в конкретный момент и как хранятся и используются данные. </a:t>
+            </a:r>
+          </a:p>
+          <a:p>
+            <a:pPr marL="457200" lvl="1" indent="0">
+              <a:buFont typeface="Arial" panose="020B0604020202020204" pitchFamily="34" charset="0"/>
+              <a:buNone/>
+            </a:pPr>
+            <a:r>
+              <a:rPr lang="ru-RU" sz="2800" dirty="0"/>
+              <a:t>	</a:t>
+            </a:r>
+            <a:r>
+              <a:rPr lang="ru-RU" sz="2800" dirty="0" smtClean="0"/>
+              <a:t>Но работает и уже хорошо.</a:t>
+            </a:r>
+          </a:p>
+          <a:p>
+            <a:pPr marL="457200" lvl="1" indent="0">
+              <a:buFont typeface="Arial" panose="020B0604020202020204" pitchFamily="34" charset="0"/>
+              <a:buNone/>
+            </a:pPr>
+            <a:r>
+              <a:rPr lang="ru-RU" sz="2800" dirty="0"/>
+              <a:t>	</a:t>
+            </a:r>
+            <a:endParaRPr lang="ru-RU" sz="2800" dirty="0"/>
+          </a:p>
+        </p:txBody>
+      </p:sp>
+    </p:spTree>
+    <p:extLst>
+      <p:ext uri="{BB962C8B-B14F-4D97-AF65-F5344CB8AC3E}">
+        <p14:creationId xmlns:p14="http://schemas.microsoft.com/office/powerpoint/2010/main" val="2378416781"/>
       </p:ext>
     </p:extLst>
   </p:cSld>
@@ -4626,11 +5198,7 @@
             </a:r>
             <a:r>
               <a:rPr lang="ru-RU" dirty="0" smtClean="0"/>
-              <a:t>(за полтора года на ВТ ни разу не встречал такого требования). К счастью, </a:t>
-            </a:r>
-            <a:r>
-              <a:rPr lang="ru-RU" dirty="0" smtClean="0"/>
-              <a:t>сайт </a:t>
+              <a:t>(за полтора года на ВТ ни разу не встречал такого требования). К счастью, сайт </a:t>
             </a:r>
             <a:r>
               <a:rPr lang="en-US" dirty="0">
@@ -4646,19 +5214,7 @@
             </a:r>
             <a:r>
               <a:rPr lang="ru-RU" dirty="0" smtClean="0"/>
-              <a:t> </a:t>
-            </a:r>
-            <a:r>
-              <a:rPr lang="ru-RU" dirty="0" smtClean="0"/>
-              <a:t>оказался </a:t>
-            </a:r>
-            <a:r>
-              <a:rPr lang="ru-RU" dirty="0" smtClean="0"/>
-              <a:t>достаточно </a:t>
-            </a:r>
-            <a:r>
-              <a:rPr lang="ru-RU" dirty="0" smtClean="0"/>
-              <a:t>информативным.</a:t>
+              <a:t> оказался достаточно информативным.</a:t>
             </a:r>
             <a:endParaRPr lang="ru-RU" dirty="0"/>
           </a:p>
@@ -5694,11 +6250,7 @@
             </a:r>
             <a:r>
               <a:rPr lang="ru-RU" dirty="0" smtClean="0"/>
-              <a:t>Здесь </a:t>
-            </a:r>
-            <a:r>
-              <a:rPr lang="ru-RU" dirty="0" smtClean="0"/>
-              <a:t>я добавил библиотеку для работы с </a:t>
+              <a:t>Здесь я добавил библиотеку для работы с </a:t>
             </a:r>
             <a:r>
               <a:rPr lang="en-US" dirty="0" smtClean="0"/>
@@ -5714,11 +6266,7 @@
             </a:r>
             <a:r>
               <a:rPr lang="ru-RU" dirty="0" smtClean="0"/>
-              <a:t>и подсчитал количество записей, соответствующих условию </a:t>
-            </a:r>
-            <a:r>
-              <a:rPr lang="ru-RU" dirty="0" smtClean="0"/>
-              <a:t>задания</a:t>
+              <a:t>и подсчитал количество записей, соответствующих условию задания</a:t>
             </a:r>
           </a:p>
           <a:p>
@@ -5832,13 +6380,8 @@
             </a:r>
             <a:r>
               <a:rPr lang="ru-RU" dirty="0" smtClean="0"/>
-              <a:t>года». Проверяем каждую рассматриваемую строку на эти условия и сразу же </a:t>
-            </a:r>
-            <a:r>
-              <a:rPr lang="ru-RU" dirty="0" smtClean="0"/>
-              <a:t>выводим.</a:t>
-            </a:r>
-            <a:endParaRPr lang="ru-RU" dirty="0" smtClean="0"/>
+              <a:t>года». Проверяем каждую рассматриваемую строку на эти условия и сразу же выводим.</a:t>
+            </a:r>
           </a:p>
           <a:p>
             <a:pPr marL="0" indent="0">
@@ -5980,11 +6523,7 @@
             </a:pPr>
             <a:r>
               <a:rPr lang="ru-RU" dirty="0" smtClean="0"/>
-              <a:t>	Для пятого задания </a:t>
-            </a:r>
-            <a:r>
-              <a:rPr lang="ru-RU" dirty="0" smtClean="0"/>
-              <a:t>мне понадобится </a:t>
+              <a:t>	Для пятого задания мне понадобится </a:t>
             </a:r>
             <a:r>
               <a:rPr lang="en-US" dirty="0" err="1" smtClean="0"/>
@@ -5996,15 +6535,7 @@
             </a:r>
             <a:r>
               <a:rPr lang="ru-RU" dirty="0" smtClean="0"/>
-              <a:t>так что </a:t>
-            </a:r>
-            <a:r>
-              <a:rPr lang="ru-RU" dirty="0" smtClean="0"/>
-              <a:t>импортирую соответствующую </a:t>
-            </a:r>
-            <a:r>
-              <a:rPr lang="ru-RU" dirty="0" smtClean="0"/>
-              <a:t>библиотеку. </a:t>
+              <a:t>так что импортирую соответствующую библиотеку. </a:t>
             </a:r>
             <a:endParaRPr lang="en-US" dirty="0" smtClean="0"/>
           </a:p>
@@ -6131,23 +6662,7 @@
             </a:pPr>
             <a:r>
               <a:rPr lang="ru-RU" dirty="0" smtClean="0"/>
-              <a:t>	</a:t>
-            </a:r>
-            <a:r>
-              <a:rPr lang="ru-RU" dirty="0" smtClean="0"/>
-              <a:t>Добавляю </a:t>
-            </a:r>
-            <a:r>
-              <a:rPr lang="ru-RU" dirty="0" smtClean="0"/>
-              <a:t>проверку на соответствие запросу пользователя и </a:t>
-            </a:r>
-            <a:r>
-              <a:rPr lang="ru-RU" dirty="0" smtClean="0"/>
-              <a:t>организую </a:t>
-            </a:r>
-            <a:r>
-              <a:rPr lang="ru-RU" dirty="0" smtClean="0"/>
-              <a:t>вывод в файл</a:t>
+              <a:t>	Добавляю проверку на соответствие запросу пользователя и организую вывод в файл</a:t>
             </a:r>
             <a:r>
               <a:rPr lang="en-US" dirty="0" smtClean="0"/>

</xml_diff>

<commit_message>
Added last last lab report
Добавлен отчет по лабораторной работе (обновленный вариант)
</commit_message>
<xml_diff>
--- a/Отчет по лабораторной работе №1.pptx
+++ b/Отчет по лабораторной работе №1.pptx
@@ -3784,15 +3784,7 @@
             </a:r>
             <a:r>
               <a:rPr lang="ru-RU" sz="2800" dirty="0" smtClean="0"/>
-              <a:t>В 4 и 5 задании я неправильно указал с какого по какой символы являются годом. (Да, надо было </a:t>
-            </a:r>
-            <a:r>
-              <a:rPr lang="ru-RU" sz="2800" dirty="0" smtClean="0"/>
-              <a:t>работать с датой не как со строкой</a:t>
-            </a:r>
-            <a:r>
-              <a:rPr lang="ru-RU" sz="2800" dirty="0" smtClean="0"/>
-              <a:t>)</a:t>
+              <a:t>В 4 и 5 задании я неправильно указал с какого по какой символы являются годом. (Да, надо было работать с датой не как со строкой)</a:t>
             </a:r>
             <a:endParaRPr lang="ru-RU" sz="2800" dirty="0"/>
           </a:p>
@@ -5047,7 +5039,6 @@
               <a:rPr lang="ru-RU" sz="2800" dirty="0"/>
               <a:t>	</a:t>
             </a:r>
-            <a:endParaRPr lang="ru-RU" sz="2800" dirty="0"/>
           </a:p>
         </p:txBody>
       </p:sp>

</xml_diff>